<commit_message>
DevTalks post talk fix
</commit_message>
<xml_diff>
--- a/200610 - DevTalks @Bucharest - Virtual/100 Machines do 100s job in 1s.pptx
+++ b/200610 - DevTalks @Bucharest - Virtual/100 Machines do 100s job in 1s.pptx
@@ -5,16 +5,17 @@
     <p:sldMasterId id="2147483660" r:id="rId4"/>
   </p:sldMasterIdLst>
   <p:notesMasterIdLst>
-    <p:notesMasterId r:id="rId9"/>
+    <p:notesMasterId r:id="rId10"/>
   </p:notesMasterIdLst>
   <p:handoutMasterIdLst>
-    <p:handoutMasterId r:id="rId10"/>
+    <p:handoutMasterId r:id="rId11"/>
   </p:handoutMasterIdLst>
   <p:sldIdLst>
     <p:sldId id="256" r:id="rId5"/>
     <p:sldId id="271" r:id="rId6"/>
     <p:sldId id="279" r:id="rId7"/>
     <p:sldId id="280" r:id="rId8"/>
+    <p:sldId id="281" r:id="rId9"/>
   </p:sldIdLst>
   <p:sldSz cx="12192000" cy="6858000"/>
   <p:notesSz cx="6858000" cy="9144000"/>
@@ -126,6 +127,7 @@
             <p14:sldId id="271"/>
             <p14:sldId id="279"/>
             <p14:sldId id="280"/>
+            <p14:sldId id="281"/>
           </p14:sldIdLst>
         </p14:section>
       </p14:sectionLst>
@@ -751,6 +753,95 @@
     <p:extLst>
       <p:ext uri="{BB962C8B-B14F-4D97-AF65-F5344CB8AC3E}">
         <p14:creationId xmlns:p14="http://schemas.microsoft.com/office/powerpoint/2010/main" val="1011769815"/>
+      </p:ext>
+    </p:extLst>
+  </p:cSld>
+  <p:clrMapOvr>
+    <a:masterClrMapping/>
+  </p:clrMapOvr>
+</p:notes>
+</file>
+
+<file path=ppt/notesSlides/notesSlide2.xml><?xml version="1.0" encoding="utf-8"?>
+<p:notes xmlns:a="http://schemas.openxmlformats.org/drawingml/2006/main" xmlns:r="http://schemas.openxmlformats.org/officeDocument/2006/relationships" xmlns:p="http://schemas.openxmlformats.org/presentationml/2006/main">
+  <p:cSld>
+    <p:spTree>
+      <p:nvGrpSpPr>
+        <p:cNvPr id="1" name=""/>
+        <p:cNvGrpSpPr/>
+        <p:nvPr/>
+      </p:nvGrpSpPr>
+      <p:grpSpPr>
+        <a:xfrm>
+          <a:off x="0" y="0"/>
+          <a:ext cx="0" cy="0"/>
+          <a:chOff x="0" y="0"/>
+          <a:chExt cx="0" cy="0"/>
+        </a:xfrm>
+      </p:grpSpPr>
+      <p:sp>
+        <p:nvSpPr>
+          <p:cNvPr id="2" name="Slide Image Placeholder 1"/>
+          <p:cNvSpPr>
+            <a:spLocks noGrp="1" noRot="1" noChangeAspect="1"/>
+          </p:cNvSpPr>
+          <p:nvPr>
+            <p:ph type="sldImg"/>
+          </p:nvPr>
+        </p:nvSpPr>
+        <p:spPr>
+          <a:xfrm>
+            <a:off x="685800" y="1143000"/>
+            <a:ext cx="5486400" cy="3086100"/>
+          </a:xfrm>
+        </p:spPr>
+      </p:sp>
+      <p:sp>
+        <p:nvSpPr>
+          <p:cNvPr id="3" name="Notes Placeholder 2"/>
+          <p:cNvSpPr>
+            <a:spLocks noGrp="1"/>
+          </p:cNvSpPr>
+          <p:nvPr>
+            <p:ph type="body" idx="1"/>
+          </p:nvPr>
+        </p:nvSpPr>
+        <p:spPr/>
+        <p:txBody>
+          <a:bodyPr/>
+          <a:lstStyle/>
+          <a:p>
+            <a:endParaRPr lang="en-US" dirty="0"/>
+          </a:p>
+        </p:txBody>
+      </p:sp>
+      <p:sp>
+        <p:nvSpPr>
+          <p:cNvPr id="4" name="Slide Number Placeholder 3"/>
+          <p:cNvSpPr>
+            <a:spLocks noGrp="1"/>
+          </p:cNvSpPr>
+          <p:nvPr>
+            <p:ph type="sldNum" sz="quarter" idx="10"/>
+          </p:nvPr>
+        </p:nvSpPr>
+        <p:spPr/>
+        <p:txBody>
+          <a:bodyPr/>
+          <a:lstStyle/>
+          <a:p>
+            <a:fld id="{DF61EA0F-A667-4B49-8422-0062BC55E249}" type="slidenum">
+              <a:rPr lang="en-US" smtClean="0"/>
+              <a:t>5</a:t>
+            </a:fld>
+            <a:endParaRPr lang="en-US" dirty="0"/>
+          </a:p>
+        </p:txBody>
+      </p:sp>
+    </p:spTree>
+    <p:extLst>
+      <p:ext uri="{BB962C8B-B14F-4D97-AF65-F5344CB8AC3E}">
+        <p14:creationId xmlns:p14="http://schemas.microsoft.com/office/powerpoint/2010/main" val="2632572632"/>
       </p:ext>
     </p:extLst>
   </p:cSld>
@@ -4908,6 +4999,118 @@
     <p:extLst>
       <p:ext uri="{BB962C8B-B14F-4D97-AF65-F5344CB8AC3E}">
         <p14:creationId xmlns:p14="http://schemas.microsoft.com/office/powerpoint/2010/main" val="2557145834"/>
+      </p:ext>
+    </p:extLst>
+  </p:cSld>
+  <p:clrMapOvr>
+    <a:masterClrMapping/>
+  </p:clrMapOvr>
+</p:sld>
+</file>
+
+<file path=ppt/slides/slide5.xml><?xml version="1.0" encoding="utf-8"?>
+<p:sld xmlns:a="http://schemas.openxmlformats.org/drawingml/2006/main" xmlns:r="http://schemas.openxmlformats.org/officeDocument/2006/relationships" xmlns:p="http://schemas.openxmlformats.org/presentationml/2006/main">
+  <p:cSld>
+    <p:spTree>
+      <p:nvGrpSpPr>
+        <p:cNvPr id="1" name=""/>
+        <p:cNvGrpSpPr/>
+        <p:nvPr/>
+      </p:nvGrpSpPr>
+      <p:grpSpPr>
+        <a:xfrm>
+          <a:off x="0" y="0"/>
+          <a:ext cx="0" cy="0"/>
+          <a:chOff x="0" y="0"/>
+          <a:chExt cx="0" cy="0"/>
+        </a:xfrm>
+      </p:grpSpPr>
+      <p:sp>
+        <p:nvSpPr>
+          <p:cNvPr id="2" name="Title 1"/>
+          <p:cNvSpPr>
+            <a:spLocks noGrp="1"/>
+          </p:cNvSpPr>
+          <p:nvPr>
+            <p:ph type="ctrTitle"/>
+          </p:nvPr>
+        </p:nvSpPr>
+        <p:spPr>
+          <a:xfrm>
+            <a:off x="838200" y="1164324"/>
+            <a:ext cx="10515600" cy="2387600"/>
+          </a:xfrm>
+        </p:spPr>
+        <p:txBody>
+          <a:bodyPr anchor="ctr" anchorCtr="0">
+            <a:normAutofit/>
+          </a:bodyPr>
+          <a:lstStyle/>
+          <a:p>
+            <a:r>
+              <a:rPr lang="en-US" sz="4800" dirty="0">
+                <a:solidFill>
+                  <a:schemeClr val="bg1"/>
+                </a:solidFill>
+              </a:rPr>
+              <a:t>100 Machines do 100s job in 1s</a:t>
+            </a:r>
+          </a:p>
+        </p:txBody>
+      </p:sp>
+      <p:sp>
+        <p:nvSpPr>
+          <p:cNvPr id="3" name="Subtitle 2"/>
+          <p:cNvSpPr>
+            <a:spLocks noGrp="1"/>
+          </p:cNvSpPr>
+          <p:nvPr>
+            <p:ph type="subTitle" idx="4294967295"/>
+          </p:nvPr>
+        </p:nvSpPr>
+        <p:spPr>
+          <a:xfrm>
+            <a:off x="855620" y="2933105"/>
+            <a:ext cx="9582736" cy="1137793"/>
+          </a:xfrm>
+        </p:spPr>
+        <p:txBody>
+          <a:bodyPr>
+            <a:normAutofit/>
+          </a:bodyPr>
+          <a:lstStyle/>
+          <a:p>
+            <a:r>
+              <a:rPr lang="en-US" sz="2400" dirty="0">
+                <a:solidFill>
+                  <a:schemeClr val="bg1"/>
+                </a:solidFill>
+                <a:latin typeface="+mj-lt"/>
+              </a:rPr>
+              <a:t>Roberto Freato – Solution Architect / CTO @</a:t>
+            </a:r>
+            <a:r>
+              <a:rPr lang="en-US" sz="2400" dirty="0" err="1">
+                <a:solidFill>
+                  <a:schemeClr val="bg1"/>
+                </a:solidFill>
+                <a:latin typeface="+mj-lt"/>
+              </a:rPr>
+              <a:t>Witailer</a:t>
+            </a:r>
+            <a:endParaRPr lang="en-US" sz="2400" dirty="0">
+              <a:solidFill>
+                <a:schemeClr val="bg1"/>
+              </a:solidFill>
+              <a:latin typeface="+mj-lt"/>
+            </a:endParaRPr>
+          </a:p>
+        </p:txBody>
+      </p:sp>
+    </p:spTree>
+    <p:extLst>
+      <p:ext uri="{BB962C8B-B14F-4D97-AF65-F5344CB8AC3E}">
+        <p14:creationId xmlns:p14="http://schemas.microsoft.com/office/powerpoint/2010/main" val="3915777662"/>
       </p:ext>
     </p:extLst>
   </p:cSld>
@@ -5675,6 +5878,23 @@
 </file>
 
 <file path=customXml/item1.xml><?xml version="1.0" encoding="utf-8"?>
+<p:properties xmlns:p="http://schemas.microsoft.com/office/2006/metadata/properties" xmlns:xsi="http://www.w3.org/2001/XMLSchema-instance" xmlns:pc="http://schemas.microsoft.com/office/infopath/2007/PartnerControls">
+  <documentManagement>
+    <MediaServiceKeyPoints xmlns="71af3243-3dd4-4a8d-8c0d-dd76da1f02a5" xsi:nil="true"/>
+  </documentManagement>
+</p:properties>
+</file>
+
+<file path=customXml/item2.xml><?xml version="1.0" encoding="utf-8"?>
+<?mso-contentType ?>
+<FormTemplates xmlns="http://schemas.microsoft.com/sharepoint/v3/contenttype/forms">
+  <Display>DocumentLibraryForm</Display>
+  <Edit>DocumentLibraryForm</Edit>
+  <New>DocumentLibraryForm</New>
+</FormTemplates>
+</file>
+
+<file path=customXml/item3.xml><?xml version="1.0" encoding="utf-8"?>
 <ct:contentTypeSchema xmlns:ct="http://schemas.microsoft.com/office/2006/metadata/contentType" xmlns:ma="http://schemas.microsoft.com/office/2006/metadata/properties/metaAttributes" ct:_="" ma:_="" ma:contentTypeName="Document" ma:contentTypeID="0x01010079F111ED35F8CC479449609E8A0923A6" ma:contentTypeVersion="11" ma:contentTypeDescription="Create a new document." ma:contentTypeScope="" ma:versionID="96291512c1ee715ab617f4c07df79fc1">
   <xsd:schema xmlns:xsd="http://www.w3.org/2001/XMLSchema" xmlns:xs="http://www.w3.org/2001/XMLSchema" xmlns:p="http://schemas.microsoft.com/office/2006/metadata/properties" xmlns:ns2="71af3243-3dd4-4a8d-8c0d-dd76da1f02a5" xmlns:ns3="16c05727-aa75-4e4a-9b5f-8a80a1165891" targetNamespace="http://schemas.microsoft.com/office/2006/metadata/properties" ma:root="true" ma:fieldsID="8256c27c40ca5c40ce1cf6c44f0205df" ns2:_="" ns3:_="">
     <xsd:import namespace="71af3243-3dd4-4a8d-8c0d-dd76da1f02a5"/>
@@ -5885,24 +6105,25 @@
 </ct:contentTypeSchema>
 </file>
 
-<file path=customXml/item2.xml><?xml version="1.0" encoding="utf-8"?>
-<?mso-contentType ?>
-<FormTemplates xmlns="http://schemas.microsoft.com/sharepoint/v3/contenttype/forms">
-  <Display>DocumentLibraryForm</Display>
-  <Edit>DocumentLibraryForm</Edit>
-  <New>DocumentLibraryForm</New>
-</FormTemplates>
+<file path=customXml/itemProps1.xml><?xml version="1.0" encoding="utf-8"?>
+<ds:datastoreItem xmlns:ds="http://schemas.openxmlformats.org/officeDocument/2006/customXml" ds:itemID="{7BED6A94-6CEC-4690-B5D0-3E831BCC769C}">
+  <ds:schemaRefs>
+    <ds:schemaRef ds:uri="http://schemas.microsoft.com/office/2006/metadata/properties"/>
+    <ds:schemaRef ds:uri="http://schemas.microsoft.com/office/infopath/2007/PartnerControls"/>
+    <ds:schemaRef ds:uri="71af3243-3dd4-4a8d-8c0d-dd76da1f02a5"/>
+  </ds:schemaRefs>
+</ds:datastoreItem>
 </file>
 
-<file path=customXml/item3.xml><?xml version="1.0" encoding="utf-8"?>
-<p:properties xmlns:p="http://schemas.microsoft.com/office/2006/metadata/properties" xmlns:xsi="http://www.w3.org/2001/XMLSchema-instance" xmlns:pc="http://schemas.microsoft.com/office/infopath/2007/PartnerControls">
-  <documentManagement>
-    <MediaServiceKeyPoints xmlns="71af3243-3dd4-4a8d-8c0d-dd76da1f02a5" xsi:nil="true"/>
-  </documentManagement>
-</p:properties>
+<file path=customXml/itemProps2.xml><?xml version="1.0" encoding="utf-8"?>
+<ds:datastoreItem xmlns:ds="http://schemas.openxmlformats.org/officeDocument/2006/customXml" ds:itemID="{A68F36FF-D6F8-4F25-B1D6-7893F2294B63}">
+  <ds:schemaRefs>
+    <ds:schemaRef ds:uri="http://schemas.microsoft.com/sharepoint/v3/contenttype/forms"/>
+  </ds:schemaRefs>
+</ds:datastoreItem>
 </file>
 
-<file path=customXml/itemProps1.xml><?xml version="1.0" encoding="utf-8"?>
+<file path=customXml/itemProps3.xml><?xml version="1.0" encoding="utf-8"?>
 <ds:datastoreItem xmlns:ds="http://schemas.openxmlformats.org/officeDocument/2006/customXml" ds:itemID="{E60B3179-FCE1-482B-B473-8B7BB6F9AC8B}">
   <ds:schemaRefs>
     <ds:schemaRef ds:uri="http://schemas.microsoft.com/office/2006/metadata/contentType"/>
@@ -5919,22 +6140,4 @@
     <ds:schemaRef ds:uri="http://schemas.microsoft.com/internal/obd"/>
   </ds:schemaRefs>
 </ds:datastoreItem>
-</file>
-
-<file path=customXml/itemProps2.xml><?xml version="1.0" encoding="utf-8"?>
-<ds:datastoreItem xmlns:ds="http://schemas.openxmlformats.org/officeDocument/2006/customXml" ds:itemID="{A68F36FF-D6F8-4F25-B1D6-7893F2294B63}">
-  <ds:schemaRefs>
-    <ds:schemaRef ds:uri="http://schemas.microsoft.com/sharepoint/v3/contenttype/forms"/>
-  </ds:schemaRefs>
-</ds:datastoreItem>
-</file>
-
-<file path=customXml/itemProps3.xml><?xml version="1.0" encoding="utf-8"?>
-<ds:datastoreItem xmlns:ds="http://schemas.openxmlformats.org/officeDocument/2006/customXml" ds:itemID="{7BED6A94-6CEC-4690-B5D0-3E831BCC769C}">
-  <ds:schemaRefs>
-    <ds:schemaRef ds:uri="http://schemas.microsoft.com/office/2006/metadata/properties"/>
-    <ds:schemaRef ds:uri="http://schemas.microsoft.com/office/infopath/2007/PartnerControls"/>
-    <ds:schemaRef ds:uri="71af3243-3dd4-4a8d-8c0d-dd76da1f02a5"/>
-  </ds:schemaRefs>
-</ds:datastoreItem>
 </file>
</xml_diff>